<commit_message>
Trabajo final grupo 1 tarde (revisado)
</commit_message>
<xml_diff>
--- a/TG1_final.pptx
+++ b/TG1_final.pptx
@@ -5,7 +5,7 @@
     <p:sldMasterId id="2147483648" r:id="rId1"/>
   </p:sldMasterIdLst>
   <p:notesMasterIdLst>
-    <p:notesMasterId r:id="rId15"/>
+    <p:notesMasterId r:id="rId16"/>
   </p:notesMasterIdLst>
   <p:sldIdLst>
     <p:sldId id="256" r:id="rId2"/>
@@ -15,12 +15,13 @@
     <p:sldId id="260" r:id="rId6"/>
     <p:sldId id="262" r:id="rId7"/>
     <p:sldId id="263" r:id="rId8"/>
-    <p:sldId id="266" r:id="rId9"/>
+    <p:sldId id="271" r:id="rId9"/>
     <p:sldId id="267" r:id="rId10"/>
     <p:sldId id="269" r:id="rId11"/>
     <p:sldId id="257" r:id="rId12"/>
     <p:sldId id="258" r:id="rId13"/>
     <p:sldId id="259" r:id="rId14"/>
+    <p:sldId id="272" r:id="rId15"/>
   </p:sldIdLst>
   <p:sldSz cx="24384000" cy="13716000"/>
   <p:notesSz cx="6858000" cy="9144000"/>
@@ -322,6 +323,11 @@
       </a:defRPr>
     </a:lvl9pPr>
   </p:defaultTextStyle>
+  <p:extLst>
+    <p:ext uri="{EFAFB233-063F-42B5-8137-9DF3F51BA10A}">
+      <p15:sldGuideLst xmlns:p15="http://schemas.microsoft.com/office/powerpoint/2012/main"/>
+    </p:ext>
+  </p:extLst>
 </p:presentation>
 </file>
 
@@ -3105,29 +3111,20 @@
           </a:lstStyle>
           <a:p>
             <a:r>
-              <a:rPr dirty="0" err="1"/>
-              <a:t>Recursos</a:t>
-            </a:r>
-            <a:r>
-              <a:rPr dirty="0"/>
-              <a:t> para </a:t>
-            </a:r>
-            <a:r>
-              <a:rPr dirty="0" err="1"/>
-              <a:t>implementar</a:t>
-            </a:r>
-            <a:r>
-              <a:rPr dirty="0"/>
-              <a:t> las </a:t>
-            </a:r>
-            <a:r>
-              <a:rPr dirty="0" err="1"/>
-              <a:t>tecnologías</a:t>
-            </a:r>
-            <a:r>
-              <a:rPr dirty="0"/>
+              <a:rPr lang="es-ES" dirty="0" smtClean="0">
+                <a:latin typeface="Century Gothic" panose="020B0502020202020204" pitchFamily="34" charset="0"/>
+              </a:rPr>
+              <a:t>Desarrollo de aplicaciones para Tablet y Smartphone</a:t>
+            </a:r>
+            <a:r>
+              <a:rPr dirty="0" smtClean="0">
+                <a:latin typeface="Century Gothic" panose="020B0502020202020204" pitchFamily="34" charset="0"/>
+              </a:rPr>
               <a:t>.</a:t>
             </a:r>
+            <a:endParaRPr dirty="0">
+              <a:latin typeface="Century Gothic" panose="020B0502020202020204" pitchFamily="34" charset="0"/>
+            </a:endParaRPr>
           </a:p>
         </p:txBody>
       </p:sp>
@@ -3143,7 +3140,7 @@
         </p:nvSpPr>
         <p:spPr>
           <a:xfrm>
-            <a:off x="1778000" y="7080250"/>
+            <a:off x="1778000" y="7385050"/>
             <a:ext cx="20828000" cy="1587500"/>
           </a:xfrm>
           <a:prstGeom prst="rect">
@@ -3163,27 +3160,51 @@
           </a:lstStyle>
           <a:p>
             <a:r>
-              <a:rPr dirty="0" err="1"/>
+              <a:rPr dirty="0" err="1">
+                <a:solidFill>
+                  <a:srgbClr val="5D636B"/>
+                </a:solidFill>
+              </a:rPr>
               <a:t>Desarrollo</a:t>
             </a:r>
             <a:r>
-              <a:rPr dirty="0"/>
+              <a:rPr dirty="0">
+                <a:solidFill>
+                  <a:srgbClr val="5D636B"/>
+                </a:solidFill>
+              </a:rPr>
               <a:t> con </a:t>
             </a:r>
             <a:r>
-              <a:rPr dirty="0" err="1"/>
+              <a:rPr dirty="0" err="1">
+                <a:solidFill>
+                  <a:srgbClr val="5D636B"/>
+                </a:solidFill>
+              </a:rPr>
               <a:t>Tecnologías</a:t>
             </a:r>
             <a:r>
-              <a:rPr dirty="0"/>
+              <a:rPr dirty="0">
+                <a:solidFill>
+                  <a:srgbClr val="5D636B"/>
+                </a:solidFill>
+              </a:rPr>
               <a:t> </a:t>
             </a:r>
             <a:r>
-              <a:rPr dirty="0" err="1"/>
+              <a:rPr dirty="0" err="1">
+                <a:solidFill>
+                  <a:srgbClr val="5D636B"/>
+                </a:solidFill>
+              </a:rPr>
               <a:t>Emergentes</a:t>
             </a:r>
             <a:r>
-              <a:rPr dirty="0"/>
+              <a:rPr dirty="0">
+                <a:solidFill>
+                  <a:srgbClr val="5D636B"/>
+                </a:solidFill>
+              </a:rPr>
               <a:t>.</a:t>
             </a:r>
           </a:p>
@@ -3199,8 +3220,8 @@
         </p:nvSpPr>
         <p:spPr>
           <a:xfrm>
-            <a:off x="16209818" y="10751127"/>
-            <a:ext cx="10640291" cy="2474768"/>
+            <a:off x="17900073" y="10584873"/>
+            <a:ext cx="6206836" cy="2474768"/>
           </a:xfrm>
           <a:prstGeom prst="rect">
             <a:avLst/>
@@ -3482,49 +3503,57 @@
             </a:lvl9pPr>
           </a:lstStyle>
           <a:p>
-            <a:pPr hangingPunct="1"/>
+            <a:pPr algn="r" hangingPunct="1"/>
             <a:r>
               <a:rPr lang="es-ES" dirty="0" smtClean="0"/>
-              <a:t>Grupo 1 tarde</a:t>
-            </a:r>
-          </a:p>
-          <a:p>
-            <a:pPr hangingPunct="1"/>
+              <a:t>Grupo 1 </a:t>
+            </a:r>
+            <a:r>
+              <a:rPr lang="es-ES" dirty="0" smtClean="0"/>
+              <a:t>tarde</a:t>
+            </a:r>
+          </a:p>
+          <a:p>
+            <a:pPr algn="r" hangingPunct="1"/>
+            <a:endParaRPr lang="es-ES" sz="1200" dirty="0" smtClean="0"/>
+          </a:p>
+          <a:p>
+            <a:pPr algn="r" hangingPunct="1"/>
             <a:r>
               <a:rPr lang="es-ES" sz="2400" dirty="0" smtClean="0"/>
               <a:t>Patricia Sotodosos (coordinadora)</a:t>
             </a:r>
           </a:p>
           <a:p>
-            <a:pPr hangingPunct="1"/>
+            <a:pPr algn="r" hangingPunct="1"/>
             <a:r>
               <a:rPr lang="es-ES" sz="2400" dirty="0" smtClean="0"/>
               <a:t>Eduardo Martín</a:t>
             </a:r>
           </a:p>
           <a:p>
-            <a:pPr hangingPunct="1"/>
+            <a:pPr algn="r" hangingPunct="1"/>
             <a:r>
               <a:rPr lang="es-ES" sz="2400" dirty="0" smtClean="0"/>
               <a:t>Roberto Cabrera</a:t>
             </a:r>
           </a:p>
           <a:p>
-            <a:pPr hangingPunct="1"/>
+            <a:pPr algn="r" hangingPunct="1"/>
             <a:r>
               <a:rPr lang="es-ES" sz="2400" dirty="0" smtClean="0"/>
               <a:t>Jesús Melchor</a:t>
             </a:r>
           </a:p>
           <a:p>
-            <a:pPr hangingPunct="1"/>
+            <a:pPr algn="r" hangingPunct="1"/>
             <a:r>
               <a:rPr lang="es-ES" sz="2400" dirty="0" smtClean="0"/>
               <a:t>Eduardo V. </a:t>
             </a:r>
             <a:r>
-              <a:rPr lang="es-ES" sz="2400" dirty="0" err="1" smtClean="0"/>
-              <a:t>Izuierdo</a:t>
+              <a:rPr lang="es-ES" sz="2400" dirty="0" smtClean="0"/>
+              <a:t>Izquierdo</a:t>
             </a:r>
             <a:endParaRPr lang="es-ES" sz="2400" dirty="0" smtClean="0"/>
           </a:p>
@@ -3565,76 +3594,312 @@
       </p:grpSpPr>
       <p:sp>
         <p:nvSpPr>
-          <p:cNvPr id="122" name="Shape 122"/>
-          <p:cNvSpPr>
-            <a:spLocks noGrp="1"/>
+          <p:cNvPr id="4" name="Shape 122"/>
+          <p:cNvSpPr txBox="1">
+            <a:spLocks/>
           </p:cNvSpPr>
-          <p:nvPr>
-            <p:ph type="ctrTitle"/>
-          </p:nvPr>
+          <p:nvPr/>
         </p:nvSpPr>
         <p:spPr>
           <a:xfrm>
-            <a:off x="4322619" y="8167552"/>
-            <a:ext cx="15101455" cy="1712583"/>
+            <a:off x="858982" y="6671262"/>
+            <a:ext cx="22610617" cy="1712583"/>
           </a:xfrm>
           <a:prstGeom prst="rect">
             <a:avLst/>
           </a:prstGeom>
+          <a:ln w="12700">
+            <a:miter lim="400000"/>
+          </a:ln>
+          <a:extLst>
+            <a:ext uri="{C572A759-6A51-4108-AA02-DFA0A04FC94B}">
+              <ma14:wrappingTextBoxFlag xmlns:ma14="http://schemas.microsoft.com/office/mac/drawingml/2011/main" xmlns="" val="1"/>
+            </a:ext>
+          </a:extLst>
         </p:spPr>
         <p:txBody>
-          <a:bodyPr>
+          <a:bodyPr lIns="50800" tIns="50800" rIns="50800" bIns="50800" anchor="b">
             <a:noAutofit/>
           </a:bodyPr>
           <a:lstStyle>
-            <a:lvl1pPr>
-              <a:defRPr sz="10000" b="1">
+            <a:lvl1pPr marL="0" marR="0" indent="0" algn="ctr" defTabSz="825500" rtl="0" latinLnBrk="0">
+              <a:lnSpc>
+                <a:spcPct val="100000"/>
+              </a:lnSpc>
+              <a:spcBef>
+                <a:spcPts val="0"/>
+              </a:spcBef>
+              <a:spcAft>
+                <a:spcPts val="0"/>
+              </a:spcAft>
+              <a:buClrTx/>
+              <a:buSzTx/>
+              <a:buFontTx/>
+              <a:buNone/>
+              <a:tabLst/>
+              <a:defRPr sz="10000" b="1" i="0" u="none" strike="noStrike" cap="none" spc="0" baseline="0">
+                <a:ln>
+                  <a:noFill/>
+                </a:ln>
                 <a:solidFill>
                   <a:srgbClr val="99CC00"/>
                 </a:solidFill>
+                <a:uFillTx/>
                 <a:latin typeface="Verdana"/>
                 <a:ea typeface="Verdana"/>
                 <a:cs typeface="Verdana"/>
                 <a:sym typeface="Verdana"/>
               </a:defRPr>
             </a:lvl1pPr>
+            <a:lvl2pPr marL="0" marR="0" indent="228600" algn="ctr" defTabSz="825500" rtl="0" latinLnBrk="0">
+              <a:lnSpc>
+                <a:spcPct val="100000"/>
+              </a:lnSpc>
+              <a:spcBef>
+                <a:spcPts val="0"/>
+              </a:spcBef>
+              <a:spcAft>
+                <a:spcPts val="0"/>
+              </a:spcAft>
+              <a:buClrTx/>
+              <a:buSzTx/>
+              <a:buFontTx/>
+              <a:buNone/>
+              <a:tabLst/>
+              <a:defRPr sz="11200" b="0" i="0" u="none" strike="noStrike" cap="none" spc="0" baseline="0">
+                <a:ln>
+                  <a:noFill/>
+                </a:ln>
+                <a:solidFill>
+                  <a:srgbClr val="000000"/>
+                </a:solidFill>
+                <a:uFillTx/>
+                <a:latin typeface="+mn-lt"/>
+                <a:ea typeface="+mn-ea"/>
+                <a:cs typeface="+mn-cs"/>
+                <a:sym typeface="Helvetica Light"/>
+              </a:defRPr>
+            </a:lvl2pPr>
+            <a:lvl3pPr marL="0" marR="0" indent="457200" algn="ctr" defTabSz="825500" rtl="0" latinLnBrk="0">
+              <a:lnSpc>
+                <a:spcPct val="100000"/>
+              </a:lnSpc>
+              <a:spcBef>
+                <a:spcPts val="0"/>
+              </a:spcBef>
+              <a:spcAft>
+                <a:spcPts val="0"/>
+              </a:spcAft>
+              <a:buClrTx/>
+              <a:buSzTx/>
+              <a:buFontTx/>
+              <a:buNone/>
+              <a:tabLst/>
+              <a:defRPr sz="11200" b="0" i="0" u="none" strike="noStrike" cap="none" spc="0" baseline="0">
+                <a:ln>
+                  <a:noFill/>
+                </a:ln>
+                <a:solidFill>
+                  <a:srgbClr val="000000"/>
+                </a:solidFill>
+                <a:uFillTx/>
+                <a:latin typeface="+mn-lt"/>
+                <a:ea typeface="+mn-ea"/>
+                <a:cs typeface="+mn-cs"/>
+                <a:sym typeface="Helvetica Light"/>
+              </a:defRPr>
+            </a:lvl3pPr>
+            <a:lvl4pPr marL="0" marR="0" indent="685800" algn="ctr" defTabSz="825500" rtl="0" latinLnBrk="0">
+              <a:lnSpc>
+                <a:spcPct val="100000"/>
+              </a:lnSpc>
+              <a:spcBef>
+                <a:spcPts val="0"/>
+              </a:spcBef>
+              <a:spcAft>
+                <a:spcPts val="0"/>
+              </a:spcAft>
+              <a:buClrTx/>
+              <a:buSzTx/>
+              <a:buFontTx/>
+              <a:buNone/>
+              <a:tabLst/>
+              <a:defRPr sz="11200" b="0" i="0" u="none" strike="noStrike" cap="none" spc="0" baseline="0">
+                <a:ln>
+                  <a:noFill/>
+                </a:ln>
+                <a:solidFill>
+                  <a:srgbClr val="000000"/>
+                </a:solidFill>
+                <a:uFillTx/>
+                <a:latin typeface="+mn-lt"/>
+                <a:ea typeface="+mn-ea"/>
+                <a:cs typeface="+mn-cs"/>
+                <a:sym typeface="Helvetica Light"/>
+              </a:defRPr>
+            </a:lvl4pPr>
+            <a:lvl5pPr marL="0" marR="0" indent="914400" algn="ctr" defTabSz="825500" rtl="0" latinLnBrk="0">
+              <a:lnSpc>
+                <a:spcPct val="100000"/>
+              </a:lnSpc>
+              <a:spcBef>
+                <a:spcPts val="0"/>
+              </a:spcBef>
+              <a:spcAft>
+                <a:spcPts val="0"/>
+              </a:spcAft>
+              <a:buClrTx/>
+              <a:buSzTx/>
+              <a:buFontTx/>
+              <a:buNone/>
+              <a:tabLst/>
+              <a:defRPr sz="11200" b="0" i="0" u="none" strike="noStrike" cap="none" spc="0" baseline="0">
+                <a:ln>
+                  <a:noFill/>
+                </a:ln>
+                <a:solidFill>
+                  <a:srgbClr val="000000"/>
+                </a:solidFill>
+                <a:uFillTx/>
+                <a:latin typeface="+mn-lt"/>
+                <a:ea typeface="+mn-ea"/>
+                <a:cs typeface="+mn-cs"/>
+                <a:sym typeface="Helvetica Light"/>
+              </a:defRPr>
+            </a:lvl5pPr>
+            <a:lvl6pPr marL="0" marR="0" indent="1143000" algn="ctr" defTabSz="825500" rtl="0" latinLnBrk="0">
+              <a:lnSpc>
+                <a:spcPct val="100000"/>
+              </a:lnSpc>
+              <a:spcBef>
+                <a:spcPts val="0"/>
+              </a:spcBef>
+              <a:spcAft>
+                <a:spcPts val="0"/>
+              </a:spcAft>
+              <a:buClrTx/>
+              <a:buSzTx/>
+              <a:buFontTx/>
+              <a:buNone/>
+              <a:tabLst/>
+              <a:defRPr sz="11200" b="0" i="0" u="none" strike="noStrike" cap="none" spc="0" baseline="0">
+                <a:ln>
+                  <a:noFill/>
+                </a:ln>
+                <a:solidFill>
+                  <a:srgbClr val="000000"/>
+                </a:solidFill>
+                <a:uFillTx/>
+                <a:latin typeface="+mn-lt"/>
+                <a:ea typeface="+mn-ea"/>
+                <a:cs typeface="+mn-cs"/>
+                <a:sym typeface="Helvetica Light"/>
+              </a:defRPr>
+            </a:lvl6pPr>
+            <a:lvl7pPr marL="0" marR="0" indent="1371600" algn="ctr" defTabSz="825500" rtl="0" latinLnBrk="0">
+              <a:lnSpc>
+                <a:spcPct val="100000"/>
+              </a:lnSpc>
+              <a:spcBef>
+                <a:spcPts val="0"/>
+              </a:spcBef>
+              <a:spcAft>
+                <a:spcPts val="0"/>
+              </a:spcAft>
+              <a:buClrTx/>
+              <a:buSzTx/>
+              <a:buFontTx/>
+              <a:buNone/>
+              <a:tabLst/>
+              <a:defRPr sz="11200" b="0" i="0" u="none" strike="noStrike" cap="none" spc="0" baseline="0">
+                <a:ln>
+                  <a:noFill/>
+                </a:ln>
+                <a:solidFill>
+                  <a:srgbClr val="000000"/>
+                </a:solidFill>
+                <a:uFillTx/>
+                <a:latin typeface="+mn-lt"/>
+                <a:ea typeface="+mn-ea"/>
+                <a:cs typeface="+mn-cs"/>
+                <a:sym typeface="Helvetica Light"/>
+              </a:defRPr>
+            </a:lvl7pPr>
+            <a:lvl8pPr marL="0" marR="0" indent="1600200" algn="ctr" defTabSz="825500" rtl="0" latinLnBrk="0">
+              <a:lnSpc>
+                <a:spcPct val="100000"/>
+              </a:lnSpc>
+              <a:spcBef>
+                <a:spcPts val="0"/>
+              </a:spcBef>
+              <a:spcAft>
+                <a:spcPts val="0"/>
+              </a:spcAft>
+              <a:buClrTx/>
+              <a:buSzTx/>
+              <a:buFontTx/>
+              <a:buNone/>
+              <a:tabLst/>
+              <a:defRPr sz="11200" b="0" i="0" u="none" strike="noStrike" cap="none" spc="0" baseline="0">
+                <a:ln>
+                  <a:noFill/>
+                </a:ln>
+                <a:solidFill>
+                  <a:srgbClr val="000000"/>
+                </a:solidFill>
+                <a:uFillTx/>
+                <a:latin typeface="+mn-lt"/>
+                <a:ea typeface="+mn-ea"/>
+                <a:cs typeface="+mn-cs"/>
+                <a:sym typeface="Helvetica Light"/>
+              </a:defRPr>
+            </a:lvl8pPr>
+            <a:lvl9pPr marL="0" marR="0" indent="1828800" algn="ctr" defTabSz="825500" rtl="0" latinLnBrk="0">
+              <a:lnSpc>
+                <a:spcPct val="100000"/>
+              </a:lnSpc>
+              <a:spcBef>
+                <a:spcPts val="0"/>
+              </a:spcBef>
+              <a:spcAft>
+                <a:spcPts val="0"/>
+              </a:spcAft>
+              <a:buClrTx/>
+              <a:buSzTx/>
+              <a:buFontTx/>
+              <a:buNone/>
+              <a:tabLst/>
+              <a:defRPr sz="11200" b="0" i="0" u="none" strike="noStrike" cap="none" spc="0" baseline="0">
+                <a:ln>
+                  <a:noFill/>
+                </a:ln>
+                <a:solidFill>
+                  <a:srgbClr val="000000"/>
+                </a:solidFill>
+                <a:uFillTx/>
+                <a:latin typeface="+mn-lt"/>
+                <a:ea typeface="+mn-ea"/>
+                <a:cs typeface="+mn-cs"/>
+                <a:sym typeface="Helvetica Light"/>
+              </a:defRPr>
+            </a:lvl9pPr>
           </a:lstStyle>
           <a:p>
-            <a:r>
-              <a:rPr lang="es-ES" sz="16600" dirty="0" smtClean="0">
-                <a:solidFill>
-                  <a:srgbClr val="002060"/>
+            <a:pPr hangingPunct="1"/>
+            <a:r>
+              <a:rPr lang="es-ES" sz="11500" b="0" dirty="0" smtClean="0">
+                <a:solidFill>
+                  <a:srgbClr val="5D636B"/>
                 </a:solidFill>
                 <a:latin typeface="Verdana" panose="020B0604030504040204" pitchFamily="34" charset="0"/>
                 <a:ea typeface="Verdana" panose="020B0604030504040204" pitchFamily="34" charset="0"/>
                 <a:cs typeface="Verdana" panose="020B0604030504040204" pitchFamily="34" charset="0"/>
               </a:rPr>
-              <a:t>Recursos para</a:t>
-            </a:r>
-            <a:br>
-              <a:rPr lang="es-ES" sz="16600" dirty="0" smtClean="0">
-                <a:solidFill>
-                  <a:srgbClr val="002060"/>
-                </a:solidFill>
-                <a:latin typeface="Verdana" panose="020B0604030504040204" pitchFamily="34" charset="0"/>
-                <a:ea typeface="Verdana" panose="020B0604030504040204" pitchFamily="34" charset="0"/>
-                <a:cs typeface="Verdana" panose="020B0604030504040204" pitchFamily="34" charset="0"/>
-              </a:rPr>
-            </a:br>
-            <a:r>
-              <a:rPr lang="es-ES" sz="16600" dirty="0" smtClean="0">
-                <a:solidFill>
-                  <a:srgbClr val="002060"/>
-                </a:solidFill>
-                <a:latin typeface="Verdana" panose="020B0604030504040204" pitchFamily="34" charset="0"/>
-                <a:ea typeface="Verdana" panose="020B0604030504040204" pitchFamily="34" charset="0"/>
-                <a:cs typeface="Verdana" panose="020B0604030504040204" pitchFamily="34" charset="0"/>
-              </a:rPr>
-              <a:t>desarrollar</a:t>
-            </a:r>
-            <a:endParaRPr sz="16600" dirty="0">
+              <a:t>Recursos para el desarrollo de las tecnologías.</a:t>
+            </a:r>
+            <a:endParaRPr lang="es-ES" sz="11500" b="0" dirty="0">
               <a:solidFill>
-                <a:srgbClr val="002060"/>
+                <a:srgbClr val="5D636B"/>
               </a:solidFill>
               <a:latin typeface="Verdana" panose="020B0604030504040204" pitchFamily="34" charset="0"/>
               <a:ea typeface="Verdana" panose="020B0604030504040204" pitchFamily="34" charset="0"/>
@@ -3941,14 +4206,22 @@
             <a:r>
               <a:rPr dirty="0" err="1">
                 <a:solidFill>
-                  <a:srgbClr val="9B9EA2"/>
+                  <a:srgbClr val="5D636B"/>
                 </a:solidFill>
               </a:rPr>
               <a:t>por</a:t>
             </a:r>
             <a:r>
+              <a:rPr dirty="0">
+                <a:solidFill>
+                  <a:srgbClr val="5D636B"/>
+                </a:solidFill>
+              </a:rPr>
+              <a:t> </a:t>
+            </a:r>
+            <a:r>
               <a:rPr dirty="0"/>
-              <a:t> la </a:t>
+              <a:t>la </a:t>
             </a:r>
             <a:r>
               <a:rPr b="1" dirty="0" err="1">
@@ -4031,19 +4304,19 @@
               <a:t> gran </a:t>
             </a:r>
             <a:r>
-              <a:rPr dirty="0" err="1"/>
-              <a:t>pre</a:t>
-            </a:r>
-            <a:r>
               <a:rPr dirty="0" err="1">
                 <a:solidFill>
-                  <a:srgbClr val="9B9EA2"/>
-                </a:solidFill>
-              </a:rPr>
-              <a:t>sencia</a:t>
-            </a:r>
-            <a:r>
-              <a:rPr dirty="0"/>
+                  <a:srgbClr val="5D636B"/>
+                </a:solidFill>
+              </a:rPr>
+              <a:t>presencia</a:t>
+            </a:r>
+            <a:r>
+              <a:rPr dirty="0">
+                <a:solidFill>
+                  <a:srgbClr val="5D636B"/>
+                </a:solidFill>
+              </a:rPr>
               <a:t> </a:t>
             </a:r>
             <a:r>
@@ -4333,6 +4606,418 @@
 </p:sld>
 </file>
 
+<file path=ppt/slides/slide14.xml><?xml version="1.0" encoding="utf-8"?>
+<p:sld xmlns:a="http://schemas.openxmlformats.org/drawingml/2006/main" xmlns:r="http://schemas.openxmlformats.org/officeDocument/2006/relationships" xmlns:p="http://schemas.openxmlformats.org/presentationml/2006/main">
+  <p:cSld>
+    <p:spTree>
+      <p:nvGrpSpPr>
+        <p:cNvPr id="1" name=""/>
+        <p:cNvGrpSpPr/>
+        <p:nvPr/>
+      </p:nvGrpSpPr>
+      <p:grpSpPr>
+        <a:xfrm>
+          <a:off x="0" y="0"/>
+          <a:ext cx="0" cy="0"/>
+          <a:chOff x="0" y="0"/>
+          <a:chExt cx="0" cy="0"/>
+        </a:xfrm>
+      </p:grpSpPr>
+      <p:pic>
+        <p:nvPicPr>
+          <p:cNvPr id="123" name="Android-logo_tcm86-1232684.png"/>
+          <p:cNvPicPr>
+            <a:picLocks noChangeAspect="1"/>
+          </p:cNvPicPr>
+          <p:nvPr/>
+        </p:nvPicPr>
+        <p:blipFill>
+          <a:blip r:embed="rId2">
+            <a:extLst/>
+          </a:blip>
+          <a:stretch>
+            <a:fillRect/>
+          </a:stretch>
+        </p:blipFill>
+        <p:spPr>
+          <a:xfrm>
+            <a:off x="-2226006" y="7373408"/>
+            <a:ext cx="8213660" cy="8213660"/>
+          </a:xfrm>
+          <a:prstGeom prst="rect">
+            <a:avLst/>
+          </a:prstGeom>
+          <a:ln w="12700">
+            <a:miter lim="400000"/>
+          </a:ln>
+        </p:spPr>
+      </p:pic>
+      <p:pic>
+        <p:nvPicPr>
+          <p:cNvPr id="5" name="p.txt.png"/>
+          <p:cNvPicPr>
+            <a:picLocks noChangeAspect="1"/>
+          </p:cNvPicPr>
+          <p:nvPr/>
+        </p:nvPicPr>
+        <p:blipFill>
+          <a:blip r:embed="rId3">
+            <a:extLst/>
+          </a:blip>
+          <a:stretch>
+            <a:fillRect/>
+          </a:stretch>
+        </p:blipFill>
+        <p:spPr>
+          <a:xfrm>
+            <a:off x="19963754" y="8804861"/>
+            <a:ext cx="3636921" cy="4469333"/>
+          </a:xfrm>
+          <a:prstGeom prst="rect">
+            <a:avLst/>
+          </a:prstGeom>
+          <a:ln w="12700">
+            <a:miter lim="400000"/>
+          </a:ln>
+        </p:spPr>
+      </p:pic>
+      <p:sp>
+        <p:nvSpPr>
+          <p:cNvPr id="11" name="Shape 122"/>
+          <p:cNvSpPr txBox="1">
+            <a:spLocks/>
+          </p:cNvSpPr>
+          <p:nvPr/>
+        </p:nvSpPr>
+        <p:spPr>
+          <a:xfrm>
+            <a:off x="969818" y="5784571"/>
+            <a:ext cx="22610617" cy="1712583"/>
+          </a:xfrm>
+          <a:prstGeom prst="rect">
+            <a:avLst/>
+          </a:prstGeom>
+          <a:ln w="12700">
+            <a:miter lim="400000"/>
+          </a:ln>
+          <a:extLst>
+            <a:ext uri="{C572A759-6A51-4108-AA02-DFA0A04FC94B}">
+              <ma14:wrappingTextBoxFlag xmlns:ma14="http://schemas.microsoft.com/office/mac/drawingml/2011/main" xmlns="" val="1"/>
+            </a:ext>
+          </a:extLst>
+        </p:spPr>
+        <p:txBody>
+          <a:bodyPr lIns="50800" tIns="50800" rIns="50800" bIns="50800" anchor="b">
+            <a:noAutofit/>
+          </a:bodyPr>
+          <a:lstStyle>
+            <a:lvl1pPr marL="0" marR="0" indent="0" algn="ctr" defTabSz="825500" rtl="0" latinLnBrk="0">
+              <a:lnSpc>
+                <a:spcPct val="100000"/>
+              </a:lnSpc>
+              <a:spcBef>
+                <a:spcPts val="0"/>
+              </a:spcBef>
+              <a:spcAft>
+                <a:spcPts val="0"/>
+              </a:spcAft>
+              <a:buClrTx/>
+              <a:buSzTx/>
+              <a:buFontTx/>
+              <a:buNone/>
+              <a:tabLst/>
+              <a:defRPr sz="10000" b="1" i="0" u="none" strike="noStrike" cap="none" spc="0" baseline="0">
+                <a:ln>
+                  <a:noFill/>
+                </a:ln>
+                <a:solidFill>
+                  <a:srgbClr val="99CC00"/>
+                </a:solidFill>
+                <a:uFillTx/>
+                <a:latin typeface="Verdana"/>
+                <a:ea typeface="Verdana"/>
+                <a:cs typeface="Verdana"/>
+                <a:sym typeface="Verdana"/>
+              </a:defRPr>
+            </a:lvl1pPr>
+            <a:lvl2pPr marL="0" marR="0" indent="228600" algn="ctr" defTabSz="825500" rtl="0" latinLnBrk="0">
+              <a:lnSpc>
+                <a:spcPct val="100000"/>
+              </a:lnSpc>
+              <a:spcBef>
+                <a:spcPts val="0"/>
+              </a:spcBef>
+              <a:spcAft>
+                <a:spcPts val="0"/>
+              </a:spcAft>
+              <a:buClrTx/>
+              <a:buSzTx/>
+              <a:buFontTx/>
+              <a:buNone/>
+              <a:tabLst/>
+              <a:defRPr sz="11200" b="0" i="0" u="none" strike="noStrike" cap="none" spc="0" baseline="0">
+                <a:ln>
+                  <a:noFill/>
+                </a:ln>
+                <a:solidFill>
+                  <a:srgbClr val="000000"/>
+                </a:solidFill>
+                <a:uFillTx/>
+                <a:latin typeface="+mn-lt"/>
+                <a:ea typeface="+mn-ea"/>
+                <a:cs typeface="+mn-cs"/>
+                <a:sym typeface="Helvetica Light"/>
+              </a:defRPr>
+            </a:lvl2pPr>
+            <a:lvl3pPr marL="0" marR="0" indent="457200" algn="ctr" defTabSz="825500" rtl="0" latinLnBrk="0">
+              <a:lnSpc>
+                <a:spcPct val="100000"/>
+              </a:lnSpc>
+              <a:spcBef>
+                <a:spcPts val="0"/>
+              </a:spcBef>
+              <a:spcAft>
+                <a:spcPts val="0"/>
+              </a:spcAft>
+              <a:buClrTx/>
+              <a:buSzTx/>
+              <a:buFontTx/>
+              <a:buNone/>
+              <a:tabLst/>
+              <a:defRPr sz="11200" b="0" i="0" u="none" strike="noStrike" cap="none" spc="0" baseline="0">
+                <a:ln>
+                  <a:noFill/>
+                </a:ln>
+                <a:solidFill>
+                  <a:srgbClr val="000000"/>
+                </a:solidFill>
+                <a:uFillTx/>
+                <a:latin typeface="+mn-lt"/>
+                <a:ea typeface="+mn-ea"/>
+                <a:cs typeface="+mn-cs"/>
+                <a:sym typeface="Helvetica Light"/>
+              </a:defRPr>
+            </a:lvl3pPr>
+            <a:lvl4pPr marL="0" marR="0" indent="685800" algn="ctr" defTabSz="825500" rtl="0" latinLnBrk="0">
+              <a:lnSpc>
+                <a:spcPct val="100000"/>
+              </a:lnSpc>
+              <a:spcBef>
+                <a:spcPts val="0"/>
+              </a:spcBef>
+              <a:spcAft>
+                <a:spcPts val="0"/>
+              </a:spcAft>
+              <a:buClrTx/>
+              <a:buSzTx/>
+              <a:buFontTx/>
+              <a:buNone/>
+              <a:tabLst/>
+              <a:defRPr sz="11200" b="0" i="0" u="none" strike="noStrike" cap="none" spc="0" baseline="0">
+                <a:ln>
+                  <a:noFill/>
+                </a:ln>
+                <a:solidFill>
+                  <a:srgbClr val="000000"/>
+                </a:solidFill>
+                <a:uFillTx/>
+                <a:latin typeface="+mn-lt"/>
+                <a:ea typeface="+mn-ea"/>
+                <a:cs typeface="+mn-cs"/>
+                <a:sym typeface="Helvetica Light"/>
+              </a:defRPr>
+            </a:lvl4pPr>
+            <a:lvl5pPr marL="0" marR="0" indent="914400" algn="ctr" defTabSz="825500" rtl="0" latinLnBrk="0">
+              <a:lnSpc>
+                <a:spcPct val="100000"/>
+              </a:lnSpc>
+              <a:spcBef>
+                <a:spcPts val="0"/>
+              </a:spcBef>
+              <a:spcAft>
+                <a:spcPts val="0"/>
+              </a:spcAft>
+              <a:buClrTx/>
+              <a:buSzTx/>
+              <a:buFontTx/>
+              <a:buNone/>
+              <a:tabLst/>
+              <a:defRPr sz="11200" b="0" i="0" u="none" strike="noStrike" cap="none" spc="0" baseline="0">
+                <a:ln>
+                  <a:noFill/>
+                </a:ln>
+                <a:solidFill>
+                  <a:srgbClr val="000000"/>
+                </a:solidFill>
+                <a:uFillTx/>
+                <a:latin typeface="+mn-lt"/>
+                <a:ea typeface="+mn-ea"/>
+                <a:cs typeface="+mn-cs"/>
+                <a:sym typeface="Helvetica Light"/>
+              </a:defRPr>
+            </a:lvl5pPr>
+            <a:lvl6pPr marL="0" marR="0" indent="1143000" algn="ctr" defTabSz="825500" rtl="0" latinLnBrk="0">
+              <a:lnSpc>
+                <a:spcPct val="100000"/>
+              </a:lnSpc>
+              <a:spcBef>
+                <a:spcPts val="0"/>
+              </a:spcBef>
+              <a:spcAft>
+                <a:spcPts val="0"/>
+              </a:spcAft>
+              <a:buClrTx/>
+              <a:buSzTx/>
+              <a:buFontTx/>
+              <a:buNone/>
+              <a:tabLst/>
+              <a:defRPr sz="11200" b="0" i="0" u="none" strike="noStrike" cap="none" spc="0" baseline="0">
+                <a:ln>
+                  <a:noFill/>
+                </a:ln>
+                <a:solidFill>
+                  <a:srgbClr val="000000"/>
+                </a:solidFill>
+                <a:uFillTx/>
+                <a:latin typeface="+mn-lt"/>
+                <a:ea typeface="+mn-ea"/>
+                <a:cs typeface="+mn-cs"/>
+                <a:sym typeface="Helvetica Light"/>
+              </a:defRPr>
+            </a:lvl6pPr>
+            <a:lvl7pPr marL="0" marR="0" indent="1371600" algn="ctr" defTabSz="825500" rtl="0" latinLnBrk="0">
+              <a:lnSpc>
+                <a:spcPct val="100000"/>
+              </a:lnSpc>
+              <a:spcBef>
+                <a:spcPts val="0"/>
+              </a:spcBef>
+              <a:spcAft>
+                <a:spcPts val="0"/>
+              </a:spcAft>
+              <a:buClrTx/>
+              <a:buSzTx/>
+              <a:buFontTx/>
+              <a:buNone/>
+              <a:tabLst/>
+              <a:defRPr sz="11200" b="0" i="0" u="none" strike="noStrike" cap="none" spc="0" baseline="0">
+                <a:ln>
+                  <a:noFill/>
+                </a:ln>
+                <a:solidFill>
+                  <a:srgbClr val="000000"/>
+                </a:solidFill>
+                <a:uFillTx/>
+                <a:latin typeface="+mn-lt"/>
+                <a:ea typeface="+mn-ea"/>
+                <a:cs typeface="+mn-cs"/>
+                <a:sym typeface="Helvetica Light"/>
+              </a:defRPr>
+            </a:lvl7pPr>
+            <a:lvl8pPr marL="0" marR="0" indent="1600200" algn="ctr" defTabSz="825500" rtl="0" latinLnBrk="0">
+              <a:lnSpc>
+                <a:spcPct val="100000"/>
+              </a:lnSpc>
+              <a:spcBef>
+                <a:spcPts val="0"/>
+              </a:spcBef>
+              <a:spcAft>
+                <a:spcPts val="0"/>
+              </a:spcAft>
+              <a:buClrTx/>
+              <a:buSzTx/>
+              <a:buFontTx/>
+              <a:buNone/>
+              <a:tabLst/>
+              <a:defRPr sz="11200" b="0" i="0" u="none" strike="noStrike" cap="none" spc="0" baseline="0">
+                <a:ln>
+                  <a:noFill/>
+                </a:ln>
+                <a:solidFill>
+                  <a:srgbClr val="000000"/>
+                </a:solidFill>
+                <a:uFillTx/>
+                <a:latin typeface="+mn-lt"/>
+                <a:ea typeface="+mn-ea"/>
+                <a:cs typeface="+mn-cs"/>
+                <a:sym typeface="Helvetica Light"/>
+              </a:defRPr>
+            </a:lvl8pPr>
+            <a:lvl9pPr marL="0" marR="0" indent="1828800" algn="ctr" defTabSz="825500" rtl="0" latinLnBrk="0">
+              <a:lnSpc>
+                <a:spcPct val="100000"/>
+              </a:lnSpc>
+              <a:spcBef>
+                <a:spcPts val="0"/>
+              </a:spcBef>
+              <a:spcAft>
+                <a:spcPts val="0"/>
+              </a:spcAft>
+              <a:buClrTx/>
+              <a:buSzTx/>
+              <a:buFontTx/>
+              <a:buNone/>
+              <a:tabLst/>
+              <a:defRPr sz="11200" b="0" i="0" u="none" strike="noStrike" cap="none" spc="0" baseline="0">
+                <a:ln>
+                  <a:noFill/>
+                </a:ln>
+                <a:solidFill>
+                  <a:srgbClr val="000000"/>
+                </a:solidFill>
+                <a:uFillTx/>
+                <a:latin typeface="+mn-lt"/>
+                <a:ea typeface="+mn-ea"/>
+                <a:cs typeface="+mn-cs"/>
+                <a:sym typeface="Helvetica Light"/>
+              </a:defRPr>
+            </a:lvl9pPr>
+          </a:lstStyle>
+          <a:p>
+            <a:pPr hangingPunct="1"/>
+            <a:r>
+              <a:rPr lang="es-ES" sz="11500" b="0" dirty="0" smtClean="0">
+                <a:solidFill>
+                  <a:srgbClr val="5D636B"/>
+                </a:solidFill>
+                <a:latin typeface="Verdana" panose="020B0604030504040204" pitchFamily="34" charset="0"/>
+                <a:ea typeface="Verdana" panose="020B0604030504040204" pitchFamily="34" charset="0"/>
+                <a:cs typeface="Verdana" panose="020B0604030504040204" pitchFamily="34" charset="0"/>
+              </a:rPr>
+              <a:t>Conclusión</a:t>
+            </a:r>
+            <a:endParaRPr lang="es-ES" sz="11500" b="0" dirty="0">
+              <a:solidFill>
+                <a:srgbClr val="5D636B"/>
+              </a:solidFill>
+              <a:latin typeface="Verdana" panose="020B0604030504040204" pitchFamily="34" charset="0"/>
+              <a:ea typeface="Verdana" panose="020B0604030504040204" pitchFamily="34" charset="0"/>
+              <a:cs typeface="Verdana" panose="020B0604030504040204" pitchFamily="34" charset="0"/>
+            </a:endParaRPr>
+          </a:p>
+        </p:txBody>
+      </p:sp>
+    </p:spTree>
+    <p:extLst>
+      <p:ext uri="{BB962C8B-B14F-4D97-AF65-F5344CB8AC3E}">
+        <p14:creationId xmlns:p14="http://schemas.microsoft.com/office/powerpoint/2010/main" val="1307049620"/>
+      </p:ext>
+    </p:extLst>
+  </p:cSld>
+  <p:clrMapOvr>
+    <a:masterClrMapping/>
+  </p:clrMapOvr>
+  <p:transition spd="slow"/>
+  <p:timing>
+    <p:tnLst>
+      <p:par>
+        <p:cTn id="1" dur="indefinite" restart="never" nodeType="tmRoot"/>
+      </p:par>
+    </p:tnLst>
+  </p:timing>
+</p:sld>
+</file>
+
 <file path=ppt/slides/slide2.xml><?xml version="1.0" encoding="utf-8"?>
 <p:sld xmlns:a="http://schemas.openxmlformats.org/drawingml/2006/main" xmlns:r="http://schemas.openxmlformats.org/officeDocument/2006/relationships" xmlns:p="http://schemas.openxmlformats.org/presentationml/2006/main">
   <p:cSld>
@@ -4388,14 +5073,14 @@
             <a:r>
               <a:rPr lang="es-ES" dirty="0" smtClean="0">
                 <a:solidFill>
-                  <a:srgbClr val="002060"/>
+                  <a:srgbClr val="5D636B"/>
                 </a:solidFill>
               </a:rPr>
               <a:t>Descripción</a:t>
             </a:r>
             <a:endParaRPr dirty="0">
               <a:solidFill>
-                <a:srgbClr val="002060"/>
+                <a:srgbClr val="5D636B"/>
               </a:solidFill>
             </a:endParaRPr>
           </a:p>
@@ -4569,13 +5254,6 @@
               </a:rPr>
               <a:t>Herramientas especializadas en los sistemas más importantes: Google Play, Windows Store, Apple Store</a:t>
             </a:r>
-            <a:endParaRPr lang="es-ES" sz="5400" dirty="0">
-              <a:solidFill>
-                <a:srgbClr val="53585F"/>
-              </a:solidFill>
-              <a:latin typeface="Arial" panose="020B0604020202020204" pitchFamily="34" charset="0"/>
-              <a:cs typeface="Arial" panose="020B0604020202020204" pitchFamily="34" charset="0"/>
-            </a:endParaRPr>
           </a:p>
         </p:txBody>
       </p:sp>
@@ -4614,13 +5292,6 @@
               </a:rPr>
               <a:t>Aplicaciones gratuitas o de pago</a:t>
             </a:r>
-            <a:endParaRPr lang="es-ES" sz="5400" dirty="0">
-              <a:solidFill>
-                <a:srgbClr val="53585F"/>
-              </a:solidFill>
-              <a:latin typeface="Arial" panose="020B0604020202020204" pitchFamily="34" charset="0"/>
-              <a:cs typeface="Arial" panose="020B0604020202020204" pitchFamily="34" charset="0"/>
-            </a:endParaRPr>
           </a:p>
         </p:txBody>
       </p:sp>
@@ -4666,10 +5337,6 @@
               </a:rPr>
               <a:t>.</a:t>
             </a:r>
-            <a:endParaRPr lang="es-ES" sz="5400" dirty="0">
-              <a:latin typeface="Arial" panose="020B0604020202020204" pitchFamily="34" charset="0"/>
-              <a:cs typeface="Arial" panose="020B0604020202020204" pitchFamily="34" charset="0"/>
-            </a:endParaRPr>
           </a:p>
         </p:txBody>
       </p:sp>
@@ -4723,8 +5390,8 @@
         </p:nvSpPr>
         <p:spPr>
           <a:xfrm>
-            <a:off x="4322619" y="8167552"/>
-            <a:ext cx="15101455" cy="1712583"/>
+            <a:off x="858981" y="5729152"/>
+            <a:ext cx="22610617" cy="1712583"/>
           </a:xfrm>
           <a:prstGeom prst="rect">
             <a:avLst/>
@@ -4749,9 +5416,9 @@
           </a:lstStyle>
           <a:p>
             <a:r>
-              <a:rPr lang="es-ES" sz="16600" dirty="0" smtClean="0">
-                <a:solidFill>
-                  <a:srgbClr val="002060"/>
+              <a:rPr lang="es-ES" sz="11500" b="0" dirty="0" smtClean="0">
+                <a:solidFill>
+                  <a:srgbClr val="5D636B"/>
                 </a:solidFill>
                 <a:latin typeface="Verdana" panose="020B0604030504040204" pitchFamily="34" charset="0"/>
                 <a:ea typeface="Verdana" panose="020B0604030504040204" pitchFamily="34" charset="0"/>
@@ -4759,51 +5426,20 @@
               </a:rPr>
               <a:t>Fuentes </a:t>
             </a:r>
-            <a:br>
-              <a:rPr lang="es-ES" sz="16600" dirty="0" smtClean="0">
-                <a:solidFill>
-                  <a:srgbClr val="002060"/>
+            <a:r>
+              <a:rPr lang="es-ES" sz="11500" b="0" dirty="0" smtClean="0">
+                <a:solidFill>
+                  <a:srgbClr val="5D636B"/>
                 </a:solidFill>
                 <a:latin typeface="Verdana" panose="020B0604030504040204" pitchFamily="34" charset="0"/>
                 <a:ea typeface="Verdana" panose="020B0604030504040204" pitchFamily="34" charset="0"/>
                 <a:cs typeface="Verdana" panose="020B0604030504040204" pitchFamily="34" charset="0"/>
               </a:rPr>
-            </a:br>
-            <a:r>
-              <a:rPr lang="es-ES" sz="16600" dirty="0" smtClean="0">
-                <a:solidFill>
-                  <a:srgbClr val="002060"/>
-                </a:solidFill>
-                <a:latin typeface="Verdana" panose="020B0604030504040204" pitchFamily="34" charset="0"/>
-                <a:ea typeface="Verdana" panose="020B0604030504040204" pitchFamily="34" charset="0"/>
-                <a:cs typeface="Verdana" panose="020B0604030504040204" pitchFamily="34" charset="0"/>
-              </a:rPr>
-              <a:t>de </a:t>
-            </a:r>
-            <a:br>
-              <a:rPr lang="es-ES" sz="16600" dirty="0" smtClean="0">
-                <a:solidFill>
-                  <a:srgbClr val="002060"/>
-                </a:solidFill>
-                <a:latin typeface="Verdana" panose="020B0604030504040204" pitchFamily="34" charset="0"/>
-                <a:ea typeface="Verdana" panose="020B0604030504040204" pitchFamily="34" charset="0"/>
-                <a:cs typeface="Verdana" panose="020B0604030504040204" pitchFamily="34" charset="0"/>
-              </a:rPr>
-            </a:br>
-            <a:r>
-              <a:rPr lang="es-ES" sz="16600" dirty="0" smtClean="0">
-                <a:solidFill>
-                  <a:srgbClr val="002060"/>
-                </a:solidFill>
-                <a:latin typeface="Verdana" panose="020B0604030504040204" pitchFamily="34" charset="0"/>
-                <a:ea typeface="Verdana" panose="020B0604030504040204" pitchFamily="34" charset="0"/>
-                <a:cs typeface="Verdana" panose="020B0604030504040204" pitchFamily="34" charset="0"/>
-              </a:rPr>
-              <a:t>información</a:t>
-            </a:r>
-            <a:endParaRPr sz="16600" dirty="0">
+              <a:t>de información</a:t>
+            </a:r>
+            <a:endParaRPr sz="11500" b="0" dirty="0">
               <a:solidFill>
-                <a:srgbClr val="002060"/>
+                <a:srgbClr val="5D636B"/>
               </a:solidFill>
               <a:latin typeface="Verdana" panose="020B0604030504040204" pitchFamily="34" charset="0"/>
               <a:ea typeface="Verdana" panose="020B0604030504040204" pitchFamily="34" charset="0"/>
@@ -4888,14 +5524,14 @@
             <a:r>
               <a:rPr lang="es-ES" dirty="0" smtClean="0">
                 <a:solidFill>
-                  <a:srgbClr val="53585F"/>
+                  <a:srgbClr val="5D636B"/>
                 </a:solidFill>
               </a:rPr>
               <a:t>Generales</a:t>
             </a:r>
             <a:endParaRPr dirty="0">
               <a:solidFill>
-                <a:srgbClr val="53585F"/>
+                <a:srgbClr val="5D636B"/>
               </a:solidFill>
             </a:endParaRPr>
           </a:p>
@@ -5189,13 +5825,40 @@
               <a:t>Comparativa entre </a:t>
             </a:r>
             <a:r>
+              <a:rPr lang="es-ES" sz="5000" dirty="0" smtClean="0">
+                <a:solidFill>
+                  <a:srgbClr val="53585F"/>
+                </a:solidFill>
+                <a:cs typeface="Arial" panose="020B0604020202020204" pitchFamily="34" charset="0"/>
+              </a:rPr>
+              <a:t>iOS, </a:t>
+            </a:r>
+            <a:r>
+              <a:rPr lang="es-ES" sz="5000" dirty="0" smtClean="0">
+                <a:solidFill>
+                  <a:srgbClr val="53585F"/>
+                </a:solidFill>
+                <a:cs typeface="Arial" panose="020B0604020202020204" pitchFamily="34" charset="0"/>
+              </a:rPr>
+              <a:t>Android y Windows </a:t>
+            </a:r>
+            <a:r>
               <a:rPr lang="es-ES" sz="5000" dirty="0" err="1" smtClean="0">
                 <a:solidFill>
                   <a:srgbClr val="53585F"/>
                 </a:solidFill>
                 <a:cs typeface="Arial" panose="020B0604020202020204" pitchFamily="34" charset="0"/>
               </a:rPr>
-              <a:t>iOs</a:t>
+              <a:t>Ph</a:t>
+            </a:r>
+            <a:r>
+              <a:rPr lang="es-ES" sz="5000" dirty="0" err="1" smtClean="0">
+                <a:solidFill>
+                  <a:srgbClr val="53585F"/>
+                </a:solidFill>
+                <a:cs typeface="Arial" panose="020B0604020202020204" pitchFamily="34" charset="0"/>
+              </a:rPr>
+              <a:t>one</a:t>
             </a:r>
             <a:r>
               <a:rPr lang="es-ES" sz="5000" dirty="0" smtClean="0">
@@ -5204,16 +5867,7 @@
                 </a:solidFill>
                 <a:cs typeface="Arial" panose="020B0604020202020204" pitchFamily="34" charset="0"/>
               </a:rPr>
-              <a:t>, Android y Windows </a:t>
-            </a:r>
-            <a:r>
-              <a:rPr lang="es-ES" sz="5000" dirty="0" err="1" smtClean="0">
-                <a:solidFill>
-                  <a:srgbClr val="53585F"/>
-                </a:solidFill>
-                <a:cs typeface="Arial" panose="020B0604020202020204" pitchFamily="34" charset="0"/>
-              </a:rPr>
-              <a:t>phone</a:t>
+              <a:t>.</a:t>
             </a:r>
             <a:endParaRPr lang="es-ES" sz="5000" dirty="0" smtClean="0">
               <a:solidFill>
@@ -5282,7 +5936,7 @@
                 </a:solidFill>
                 <a:cs typeface="Arial" panose="020B0604020202020204" pitchFamily="34" charset="0"/>
               </a:rPr>
-              <a:t>aplicaciones</a:t>
+              <a:t>aplicaciones.</a:t>
             </a:r>
             <a:endParaRPr lang="es-ES" dirty="0">
               <a:solidFill>
@@ -5314,8 +5968,8 @@
         </p:nvSpPr>
         <p:spPr>
           <a:xfrm>
-            <a:off x="7833552" y="8171400"/>
-            <a:ext cx="10346102" cy="1631216"/>
+            <a:off x="7744586" y="8171400"/>
+            <a:ext cx="10524035" cy="1631216"/>
           </a:xfrm>
           <a:prstGeom prst="rect">
             <a:avLst/>
@@ -5341,7 +5995,16 @@
                 </a:solidFill>
                 <a:cs typeface="Arial" panose="020B0604020202020204" pitchFamily="34" charset="0"/>
               </a:rPr>
-              <a:t>Comparativa sistemas operativos</a:t>
+              <a:t>Comparativa sistemas </a:t>
+            </a:r>
+            <a:r>
+              <a:rPr lang="es-ES" dirty="0" smtClean="0">
+                <a:solidFill>
+                  <a:srgbClr val="53585F"/>
+                </a:solidFill>
+                <a:cs typeface="Arial" panose="020B0604020202020204" pitchFamily="34" charset="0"/>
+              </a:rPr>
+              <a:t>operativos.</a:t>
             </a:r>
             <a:endParaRPr lang="es-ES" dirty="0">
               <a:solidFill>
@@ -5670,6 +6333,15 @@
               </a:rPr>
               <a:t>Marshmallow</a:t>
             </a:r>
+            <a:r>
+              <a:rPr lang="es-ES" sz="5000" dirty="0" smtClean="0">
+                <a:solidFill>
+                  <a:srgbClr val="53585F"/>
+                </a:solidFill>
+                <a:cs typeface="Arial" panose="020B0604020202020204" pitchFamily="34" charset="0"/>
+              </a:rPr>
+              <a:t>.</a:t>
+            </a:r>
             <a:endParaRPr lang="es-ES" sz="5000" dirty="0" smtClean="0">
               <a:solidFill>
                 <a:srgbClr val="53585F"/>
@@ -5690,7 +6362,25 @@
                 </a:solidFill>
                 <a:cs typeface="Arial" panose="020B0604020202020204" pitchFamily="34" charset="0"/>
               </a:rPr>
-              <a:t>Lenguajes para Android</a:t>
+              <a:t> Lenguajes </a:t>
+            </a:r>
+            <a:r>
+              <a:rPr lang="es-ES" sz="5000" dirty="0" smtClean="0">
+                <a:solidFill>
+                  <a:srgbClr val="53585F"/>
+                </a:solidFill>
+                <a:cs typeface="Arial" panose="020B0604020202020204" pitchFamily="34" charset="0"/>
+              </a:rPr>
+              <a:t>para </a:t>
+            </a:r>
+            <a:r>
+              <a:rPr lang="es-ES" sz="5000" dirty="0" smtClean="0">
+                <a:solidFill>
+                  <a:srgbClr val="53585F"/>
+                </a:solidFill>
+                <a:cs typeface="Arial" panose="020B0604020202020204" pitchFamily="34" charset="0"/>
+              </a:rPr>
+              <a:t>Android. </a:t>
             </a:r>
             <a:endParaRPr lang="es-ES" sz="5000" dirty="0">
               <a:solidFill>
@@ -5712,8 +6402,32 @@
                 </a:solidFill>
                 <a:cs typeface="Arial" panose="020B0604020202020204" pitchFamily="34" charset="0"/>
               </a:rPr>
-              <a:t>Ventajas y desventajas</a:t>
-            </a:r>
+              <a:t> Ventajas </a:t>
+            </a:r>
+            <a:r>
+              <a:rPr lang="es-ES" sz="5000" dirty="0" smtClean="0">
+                <a:solidFill>
+                  <a:srgbClr val="53585F"/>
+                </a:solidFill>
+                <a:cs typeface="Arial" panose="020B0604020202020204" pitchFamily="34" charset="0"/>
+              </a:rPr>
+              <a:t>y </a:t>
+            </a:r>
+            <a:r>
+              <a:rPr lang="es-ES" sz="5000" dirty="0" smtClean="0">
+                <a:solidFill>
+                  <a:srgbClr val="53585F"/>
+                </a:solidFill>
+                <a:cs typeface="Arial" panose="020B0604020202020204" pitchFamily="34" charset="0"/>
+              </a:rPr>
+              <a:t>desventajas.</a:t>
+            </a:r>
+            <a:endParaRPr lang="es-ES" sz="5000" dirty="0" smtClean="0">
+              <a:solidFill>
+                <a:srgbClr val="53585F"/>
+              </a:solidFill>
+              <a:cs typeface="Arial" panose="020B0604020202020204" pitchFamily="34" charset="0"/>
+            </a:endParaRPr>
           </a:p>
           <a:p>
             <a:pPr marL="0" indent="0">
@@ -6037,7 +6751,16 @@
                 </a:solidFill>
                 <a:cs typeface="Arial" panose="020B0604020202020204" pitchFamily="34" charset="0"/>
               </a:rPr>
-              <a:t>Características sobre el desarrollo de apps en iOS.</a:t>
+              <a:t> Características </a:t>
+            </a:r>
+            <a:r>
+              <a:rPr lang="es-ES" sz="5000" dirty="0" smtClean="0">
+                <a:solidFill>
+                  <a:srgbClr val="53585F"/>
+                </a:solidFill>
+                <a:cs typeface="Arial" panose="020B0604020202020204" pitchFamily="34" charset="0"/>
+              </a:rPr>
+              <a:t>sobre el desarrollo de apps en iOS.</a:t>
             </a:r>
           </a:p>
           <a:p>
@@ -6053,7 +6776,16 @@
                 </a:solidFill>
                 <a:cs typeface="Arial" panose="020B0604020202020204" pitchFamily="34" charset="0"/>
               </a:rPr>
-              <a:t>Mejores recursos para comenzar a desarrollar.</a:t>
+              <a:t> Mejores </a:t>
+            </a:r>
+            <a:r>
+              <a:rPr lang="es-ES" sz="5000" dirty="0" smtClean="0">
+                <a:solidFill>
+                  <a:srgbClr val="53585F"/>
+                </a:solidFill>
+                <a:cs typeface="Arial" panose="020B0604020202020204" pitchFamily="34" charset="0"/>
+              </a:rPr>
+              <a:t>recursos para comenzar a desarrollar.</a:t>
             </a:r>
           </a:p>
           <a:p>
@@ -6069,7 +6801,16 @@
                 </a:solidFill>
                 <a:cs typeface="Arial" panose="020B0604020202020204" pitchFamily="34" charset="0"/>
               </a:rPr>
-              <a:t>Guía de diseño de Apple.</a:t>
+              <a:t> Guía </a:t>
+            </a:r>
+            <a:r>
+              <a:rPr lang="es-ES" sz="5000" dirty="0" smtClean="0">
+                <a:solidFill>
+                  <a:srgbClr val="53585F"/>
+                </a:solidFill>
+                <a:cs typeface="Arial" panose="020B0604020202020204" pitchFamily="34" charset="0"/>
+              </a:rPr>
+              <a:t>de diseño de Apple.</a:t>
             </a:r>
           </a:p>
           <a:p>
@@ -6085,7 +6826,25 @@
                 </a:solidFill>
                 <a:cs typeface="Arial" panose="020B0604020202020204" pitchFamily="34" charset="0"/>
               </a:rPr>
-              <a:t>Novedades sobre iOS 9</a:t>
+              <a:t> Novedades </a:t>
+            </a:r>
+            <a:r>
+              <a:rPr lang="es-ES" sz="5000" dirty="0" smtClean="0">
+                <a:solidFill>
+                  <a:srgbClr val="53585F"/>
+                </a:solidFill>
+                <a:cs typeface="Arial" panose="020B0604020202020204" pitchFamily="34" charset="0"/>
+              </a:rPr>
+              <a:t>sobre iOS </a:t>
+            </a:r>
+            <a:r>
+              <a:rPr lang="es-ES" sz="5000" dirty="0" smtClean="0">
+                <a:solidFill>
+                  <a:srgbClr val="53585F"/>
+                </a:solidFill>
+                <a:cs typeface="Arial" panose="020B0604020202020204" pitchFamily="34" charset="0"/>
+              </a:rPr>
+              <a:t>9.</a:t>
             </a:r>
             <a:endParaRPr lang="es-ES" sz="5000" dirty="0">
               <a:solidFill>
@@ -6401,7 +7160,15 @@
                   <a:srgbClr val="53585F"/>
                 </a:solidFill>
               </a:rPr>
-              <a:t>Información necesaria para comenzar el desarrollo en sistemas Windows.</a:t>
+              <a:t> Información </a:t>
+            </a:r>
+            <a:r>
+              <a:rPr lang="es-ES" sz="5000" dirty="0" smtClean="0">
+                <a:solidFill>
+                  <a:srgbClr val="53585F"/>
+                </a:solidFill>
+              </a:rPr>
+              <a:t>necesaria para comenzar el desarrollo en sistemas Windows.</a:t>
             </a:r>
           </a:p>
           <a:p>
@@ -6416,7 +7183,15 @@
                   <a:srgbClr val="53585F"/>
                 </a:solidFill>
               </a:rPr>
-              <a:t>Tiendas de aplicaciones unificadas en una sola.</a:t>
+              <a:t> Tiendas </a:t>
+            </a:r>
+            <a:r>
+              <a:rPr lang="es-ES" sz="5000" dirty="0" smtClean="0">
+                <a:solidFill>
+                  <a:srgbClr val="53585F"/>
+                </a:solidFill>
+              </a:rPr>
+              <a:t>de aplicaciones unificadas en una sola.</a:t>
             </a:r>
           </a:p>
           <a:p>
@@ -6431,7 +7206,39 @@
                   <a:srgbClr val="53585F"/>
                 </a:solidFill>
               </a:rPr>
-              <a:t>Análisis sobre Visual Studio, el entorno de desarrollo de las apps.</a:t>
+              <a:t> Análisis </a:t>
+            </a:r>
+            <a:r>
+              <a:rPr lang="es-ES" sz="5000" dirty="0" smtClean="0">
+                <a:solidFill>
+                  <a:srgbClr val="53585F"/>
+                </a:solidFill>
+              </a:rPr>
+              <a:t>sobre Visual Studio, el entorno de desarrollo de las </a:t>
+            </a:r>
+            <a:r>
+              <a:rPr lang="es-ES" sz="5000" dirty="0" err="1" smtClean="0">
+                <a:solidFill>
+                  <a:srgbClr val="53585F"/>
+                </a:solidFill>
+              </a:rPr>
+              <a:t>APP</a:t>
+            </a:r>
+            <a:r>
+              <a:rPr lang="es-ES" sz="5000" dirty="0" err="1" smtClean="0">
+                <a:solidFill>
+                  <a:srgbClr val="53585F"/>
+                </a:solidFill>
+              </a:rPr>
+              <a:t>s</a:t>
+            </a:r>
+            <a:r>
+              <a:rPr lang="es-ES" sz="5000" dirty="0" smtClean="0">
+                <a:solidFill>
+                  <a:srgbClr val="53585F"/>
+                </a:solidFill>
+              </a:rPr>
+              <a:t>.</a:t>
             </a:r>
             <a:endParaRPr lang="es-ES" sz="5000" dirty="0">
               <a:solidFill>
@@ -6517,14 +7324,30 @@
             <a:r>
               <a:rPr lang="es-ES" dirty="0" smtClean="0">
                 <a:solidFill>
-                  <a:srgbClr val="002060"/>
-                </a:solidFill>
-              </a:rPr>
-              <a:t>Cursos no gratuitos</a:t>
+                  <a:srgbClr val="5D636B"/>
+                </a:solidFill>
+              </a:rPr>
+              <a:t>Cursos </a:t>
+            </a:r>
+            <a:r>
+              <a:rPr lang="es-ES" dirty="0" smtClean="0">
+                <a:solidFill>
+                  <a:srgbClr val="5D636B"/>
+                </a:solidFill>
+              </a:rPr>
+              <a:t>no </a:t>
+            </a:r>
+            <a:r>
+              <a:rPr lang="es-ES" dirty="0" smtClean="0">
+                <a:solidFill>
+                  <a:srgbClr val="5D636B"/>
+                </a:solidFill>
+              </a:rPr>
+              <a:t>gratuitos</a:t>
             </a:r>
             <a:endParaRPr dirty="0">
               <a:solidFill>
-                <a:srgbClr val="002060"/>
+                <a:srgbClr val="5D636B"/>
               </a:solidFill>
             </a:endParaRPr>
           </a:p>
@@ -6548,7 +7371,7 @@
         </p:blipFill>
         <p:spPr>
           <a:xfrm>
-            <a:off x="2073977" y="2213271"/>
+            <a:off x="2013485" y="1356979"/>
             <a:ext cx="3737937" cy="3737937"/>
           </a:xfrm>
           <a:prstGeom prst="rect">
@@ -6577,7 +7400,7 @@
         </p:blipFill>
         <p:spPr>
           <a:xfrm>
-            <a:off x="11604014" y="5227456"/>
+            <a:off x="10671747" y="5192017"/>
             <a:ext cx="3071961" cy="3775066"/>
           </a:xfrm>
           <a:prstGeom prst="rect">
@@ -6606,7 +7429,7 @@
         </p:blipFill>
         <p:spPr>
           <a:xfrm>
-            <a:off x="19083193" y="2038995"/>
+            <a:off x="18371127" y="1742890"/>
             <a:ext cx="3449126" cy="3449127"/>
           </a:xfrm>
           <a:prstGeom prst="rect">
@@ -6619,7 +7442,7 @@
       </p:pic>
       <p:sp>
         <p:nvSpPr>
-          <p:cNvPr id="7" name="Marcador de contenido 2"/>
+          <p:cNvPr id="10" name="Marcador de contenido 2"/>
           <p:cNvSpPr>
             <a:spLocks noGrp="1"/>
           </p:cNvSpPr>
@@ -6627,8 +7450,8 @@
         </p:nvSpPr>
         <p:spPr>
           <a:xfrm>
-            <a:off x="836966" y="5193739"/>
-            <a:ext cx="9125570" cy="4351338"/>
+            <a:off x="836965" y="5193739"/>
+            <a:ext cx="9387689" cy="4351338"/>
           </a:xfrm>
           <a:prstGeom prst="rect">
             <a:avLst/>
@@ -6823,6 +7646,9 @@
               <a:lnSpc>
                 <a:spcPct val="100000"/>
               </a:lnSpc>
+              <a:buClr>
+                <a:srgbClr val="99CC00"/>
+              </a:buClr>
             </a:pPr>
             <a:r>
               <a:rPr lang="es-ES" sz="5000" dirty="0">
@@ -6833,37 +7659,77 @@
               <a:t> </a:t>
             </a:r>
             <a:r>
-              <a:rPr lang="es-ES" sz="5000" dirty="0" smtClean="0">
+              <a:rPr lang="es-ES" sz="4800" dirty="0" smtClean="0">
                 <a:solidFill>
                   <a:srgbClr val="53585F"/>
                 </a:solidFill>
               </a:rPr>
-              <a:t>Desarrollo de App para móviles</a:t>
-            </a:r>
+              <a:t>Desarrollo de App para </a:t>
+            </a:r>
+            <a:r>
+              <a:rPr lang="es-ES" sz="4800" dirty="0" smtClean="0">
+                <a:solidFill>
+                  <a:srgbClr val="53585F"/>
+                </a:solidFill>
+              </a:rPr>
+              <a:t>móviles.</a:t>
+            </a:r>
+            <a:endParaRPr lang="es-ES" sz="4800" dirty="0" smtClean="0">
+              <a:solidFill>
+                <a:srgbClr val="53585F"/>
+              </a:solidFill>
+            </a:endParaRPr>
           </a:p>
           <a:p>
             <a:pPr>
               <a:lnSpc>
                 <a:spcPct val="100000"/>
               </a:lnSpc>
+              <a:buClr>
+                <a:srgbClr val="99CC00"/>
+              </a:buClr>
             </a:pPr>
             <a:r>
-              <a:rPr lang="es-ES" sz="5000" dirty="0" smtClean="0">
+              <a:rPr lang="es-ES" sz="4800" dirty="0" smtClean="0">
                 <a:solidFill>
                   <a:srgbClr val="53585F"/>
                 </a:solidFill>
               </a:rPr>
-              <a:t>Java con Android</a:t>
-            </a:r>
+              <a:t> Java </a:t>
+            </a:r>
+            <a:r>
+              <a:rPr lang="es-ES" sz="4800" dirty="0" smtClean="0">
+                <a:solidFill>
+                  <a:srgbClr val="53585F"/>
+                </a:solidFill>
+              </a:rPr>
+              <a:t>con </a:t>
+            </a:r>
+            <a:r>
+              <a:rPr lang="es-ES" sz="4800" dirty="0" smtClean="0">
+                <a:solidFill>
+                  <a:srgbClr val="53585F"/>
+                </a:solidFill>
+              </a:rPr>
+              <a:t>Android.</a:t>
+            </a:r>
+            <a:endParaRPr lang="es-ES" sz="4800" dirty="0" smtClean="0">
+              <a:solidFill>
+                <a:srgbClr val="53585F"/>
+              </a:solidFill>
+            </a:endParaRPr>
           </a:p>
           <a:p>
             <a:pPr>
               <a:lnSpc>
                 <a:spcPct val="100000"/>
               </a:lnSpc>
+              <a:buClr>
+                <a:srgbClr val="99CC00"/>
+              </a:buClr>
             </a:pPr>
             <a:r>
-              <a:rPr lang="es-ES" sz="5400" dirty="0" smtClean="0">
+              <a:rPr lang="es-ES" sz="4800" dirty="0" smtClean="0">
                 <a:solidFill>
                   <a:srgbClr val="53585F"/>
                 </a:solidFill>
@@ -6871,14 +7737,22 @@
               <a:t> </a:t>
             </a:r>
             <a:r>
-              <a:rPr lang="es-ES" sz="5400" dirty="0">
+              <a:rPr lang="es-ES" sz="4800" dirty="0">
                 <a:solidFill>
                   <a:srgbClr val="53585F"/>
                 </a:solidFill>
               </a:rPr>
-              <a:t>Desarrollo y programación de Apps para Android</a:t>
-            </a:r>
-            <a:endParaRPr lang="es-ES" sz="5000" dirty="0" smtClean="0">
+              <a:t>Desarrollo y programación de Apps para </a:t>
+            </a:r>
+            <a:r>
+              <a:rPr lang="es-ES" sz="4800" dirty="0" smtClean="0">
+                <a:solidFill>
+                  <a:srgbClr val="53585F"/>
+                </a:solidFill>
+              </a:rPr>
+              <a:t>Android.</a:t>
+            </a:r>
+            <a:endParaRPr lang="es-ES" sz="4800" dirty="0" smtClean="0">
               <a:solidFill>
                 <a:srgbClr val="53585F"/>
               </a:solidFill>
@@ -6900,7 +7774,7 @@
       </p:sp>
       <p:sp>
         <p:nvSpPr>
-          <p:cNvPr id="8" name="Marcador de contenido 2"/>
+          <p:cNvPr id="11" name="Marcador de contenido 2"/>
           <p:cNvSpPr>
             <a:spLocks noGrp="1"/>
           </p:cNvSpPr>
@@ -6908,7 +7782,7 @@
         </p:nvSpPr>
         <p:spPr>
           <a:xfrm>
-            <a:off x="9701027" y="9002522"/>
+            <a:off x="10001148" y="9002522"/>
             <a:ext cx="7573860" cy="4351338"/>
           </a:xfrm>
           <a:prstGeom prst="rect">
@@ -7104,6 +7978,9 @@
               <a:lnSpc>
                 <a:spcPct val="100000"/>
               </a:lnSpc>
+              <a:buClr>
+                <a:srgbClr val="A8B2BB"/>
+              </a:buClr>
             </a:pPr>
             <a:r>
               <a:rPr lang="es-ES" sz="5000" dirty="0">
@@ -7114,47 +7991,63 @@
               <a:t> </a:t>
             </a:r>
             <a:r>
-              <a:rPr lang="es-ES" sz="5000" dirty="0" smtClean="0">
+              <a:rPr lang="es-ES" sz="4800" dirty="0" smtClean="0">
                 <a:solidFill>
                   <a:srgbClr val="53585F"/>
                 </a:solidFill>
               </a:rPr>
-              <a:t>Desarrollo de App iOS</a:t>
-            </a:r>
-          </a:p>
-          <a:p>
-            <a:pPr>
-              <a:lnSpc>
-                <a:spcPct val="100000"/>
-              </a:lnSpc>
-            </a:pPr>
-            <a:r>
-              <a:rPr lang="es-ES" sz="5400" dirty="0">
+              <a:t>Desarrollo de App </a:t>
+            </a:r>
+            <a:r>
+              <a:rPr lang="es-ES" sz="4800" dirty="0" smtClean="0">
                 <a:solidFill>
                   <a:srgbClr val="53585F"/>
                 </a:solidFill>
               </a:rPr>
-              <a:t> Desarrollo profesional de Apps móviles </a:t>
-            </a:r>
-            <a:r>
-              <a:rPr lang="es-ES" sz="5400" dirty="0" err="1">
-                <a:solidFill>
-                  <a:srgbClr val="53585F"/>
-                </a:solidFill>
-              </a:rPr>
-              <a:t>iOs</a:t>
-            </a:r>
-            <a:endParaRPr lang="es-ES" sz="5000" dirty="0">
+              <a:t>iOS.</a:t>
+            </a:r>
+            <a:endParaRPr lang="es-ES" sz="4800" dirty="0" smtClean="0">
               <a:solidFill>
                 <a:srgbClr val="53585F"/>
               </a:solidFill>
             </a:endParaRPr>
           </a:p>
+          <a:p>
+            <a:pPr>
+              <a:lnSpc>
+                <a:spcPct val="100000"/>
+              </a:lnSpc>
+              <a:buClr>
+                <a:srgbClr val="A8B2BB"/>
+              </a:buClr>
+            </a:pPr>
+            <a:r>
+              <a:rPr lang="es-ES" sz="4800" dirty="0">
+                <a:solidFill>
+                  <a:srgbClr val="53585F"/>
+                </a:solidFill>
+              </a:rPr>
+              <a:t> Desarrollo profesional de Apps móviles </a:t>
+            </a:r>
+            <a:r>
+              <a:rPr lang="es-ES" sz="4800" dirty="0" smtClean="0">
+                <a:solidFill>
+                  <a:srgbClr val="53585F"/>
+                </a:solidFill>
+              </a:rPr>
+              <a:t>iOS.</a:t>
+            </a:r>
+            <a:endParaRPr lang="es-ES" sz="4800" dirty="0">
+              <a:solidFill>
+                <a:srgbClr val="53585F"/>
+              </a:solidFill>
+            </a:endParaRPr>
+          </a:p>
         </p:txBody>
       </p:sp>
       <p:sp>
         <p:nvSpPr>
-          <p:cNvPr id="9" name="Marcador de contenido 2"/>
+          <p:cNvPr id="12" name="Marcador de contenido 2"/>
           <p:cNvSpPr>
             <a:spLocks noGrp="1"/>
           </p:cNvSpPr>
@@ -7342,6 +8235,9 @@
               <a:lnSpc>
                 <a:spcPct val="100000"/>
               </a:lnSpc>
+              <a:buClr>
+                <a:srgbClr val="00ADEF"/>
+              </a:buClr>
             </a:pPr>
             <a:r>
               <a:rPr lang="es-ES" sz="5000" dirty="0" smtClean="0">
@@ -7365,9 +8261,9 @@
                   <a:srgbClr val="53585F"/>
                 </a:solidFill>
               </a:rPr>
-              <a:t>Visual</a:t>
-            </a:r>
-            <a:endParaRPr lang="es-ES" sz="5000" dirty="0" smtClean="0">
+              <a:t>Visual.</a:t>
+            </a:r>
+            <a:endParaRPr lang="es-ES" sz="4800" dirty="0" smtClean="0">
               <a:solidFill>
                 <a:srgbClr val="53585F"/>
               </a:solidFill>
@@ -7378,9 +8274,12 @@
               <a:lnSpc>
                 <a:spcPct val="100000"/>
               </a:lnSpc>
+              <a:buClr>
+                <a:srgbClr val="00ADEF"/>
+              </a:buClr>
             </a:pPr>
             <a:r>
-              <a:rPr lang="es-ES" sz="5000" dirty="0">
+              <a:rPr lang="es-ES" sz="4800" dirty="0">
                 <a:solidFill>
                   <a:srgbClr val="53585F"/>
                 </a:solidFill>
@@ -7388,7 +8287,7 @@
               <a:t> </a:t>
             </a:r>
             <a:r>
-              <a:rPr lang="es-ES" sz="5000" dirty="0" smtClean="0">
+              <a:rPr lang="es-ES" sz="4800" dirty="0" smtClean="0">
                 <a:solidFill>
                   <a:srgbClr val="53585F"/>
                 </a:solidFill>
@@ -7396,7 +8295,7 @@
               <a:t>Diseño </a:t>
             </a:r>
             <a:r>
-              <a:rPr lang="es-ES" sz="5000" dirty="0">
+              <a:rPr lang="es-ES" sz="4800" dirty="0">
                 <a:solidFill>
                   <a:srgbClr val="53585F"/>
                 </a:solidFill>
@@ -7404,14 +8303,22 @@
               <a:t>de App de Windows </a:t>
             </a:r>
             <a:r>
-              <a:rPr lang="es-ES" sz="5000" dirty="0" err="1" smtClean="0">
+              <a:rPr lang="es-ES" sz="4800" dirty="0" err="1" smtClean="0">
                 <a:solidFill>
                   <a:srgbClr val="53585F"/>
                 </a:solidFill>
               </a:rPr>
               <a:t>Phone</a:t>
             </a:r>
-            <a:endParaRPr lang="es-ES" sz="5000" dirty="0">
+            <a:r>
+              <a:rPr lang="es-ES" sz="4800" dirty="0" smtClean="0">
+                <a:solidFill>
+                  <a:srgbClr val="53585F"/>
+                </a:solidFill>
+              </a:rPr>
+              <a:t>.</a:t>
+            </a:r>
+            <a:endParaRPr lang="es-ES" sz="4800" dirty="0">
               <a:solidFill>
                 <a:srgbClr val="53585F"/>
               </a:solidFill>
@@ -7422,7 +8329,7 @@
     </p:spTree>
     <p:extLst>
       <p:ext uri="{BB962C8B-B14F-4D97-AF65-F5344CB8AC3E}">
-        <p14:creationId xmlns:p14="http://schemas.microsoft.com/office/powerpoint/2010/main" val="473856169"/>
+        <p14:creationId xmlns:p14="http://schemas.microsoft.com/office/powerpoint/2010/main" val="50159050"/>
       </p:ext>
     </p:extLst>
   </p:cSld>
@@ -7495,14 +8402,14 @@
             <a:r>
               <a:rPr lang="es-ES" dirty="0" smtClean="0">
                 <a:solidFill>
-                  <a:srgbClr val="002060"/>
+                  <a:srgbClr val="5D636B"/>
                 </a:solidFill>
               </a:rPr>
               <a:t>Cursos  gratuitos</a:t>
             </a:r>
             <a:endParaRPr dirty="0">
               <a:solidFill>
-                <a:srgbClr val="002060"/>
+                <a:srgbClr val="5D636B"/>
               </a:solidFill>
             </a:endParaRPr>
           </a:p>
@@ -7605,8 +8512,8 @@
         </p:nvSpPr>
         <p:spPr>
           <a:xfrm>
-            <a:off x="849702" y="5192017"/>
-            <a:ext cx="8377425" cy="4351338"/>
+            <a:off x="221674" y="5192017"/>
+            <a:ext cx="9005454" cy="4351338"/>
           </a:xfrm>
           <a:prstGeom prst="rect">
             <a:avLst/>
@@ -7788,7 +8695,7 @@
               <a:buNone/>
             </a:pPr>
             <a:r>
-              <a:rPr lang="es-ES" sz="5000" dirty="0" smtClean="0">
+              <a:rPr lang="es-ES" sz="4800" dirty="0" smtClean="0">
                 <a:solidFill>
                   <a:srgbClr val="53585F"/>
                 </a:solidFill>
@@ -7801,9 +8708,12 @@
               <a:lnSpc>
                 <a:spcPct val="100000"/>
               </a:lnSpc>
+              <a:buClr>
+                <a:srgbClr val="99CC00"/>
+              </a:buClr>
             </a:pPr>
             <a:r>
-              <a:rPr lang="es-ES" sz="5000" dirty="0">
+              <a:rPr lang="es-ES" sz="4800" dirty="0">
                 <a:solidFill>
                   <a:srgbClr val="53585F"/>
                 </a:solidFill>
@@ -7811,7 +8721,7 @@
               <a:t> </a:t>
             </a:r>
             <a:r>
-              <a:rPr lang="en-US" sz="5000" dirty="0">
+              <a:rPr lang="en-US" sz="4800" dirty="0">
                 <a:solidFill>
                   <a:srgbClr val="53585F"/>
                 </a:solidFill>
@@ -7819,14 +8729,14 @@
               <a:t>Learn to Build a Professional App in </a:t>
             </a:r>
             <a:r>
-              <a:rPr lang="en-US" sz="5000" dirty="0" smtClean="0">
+              <a:rPr lang="en-US" sz="4800" dirty="0" smtClean="0">
                 <a:solidFill>
                   <a:srgbClr val="53585F"/>
                 </a:solidFill>
               </a:rPr>
-              <a:t>Android</a:t>
-            </a:r>
-            <a:endParaRPr lang="es-ES" sz="5400" dirty="0" smtClean="0">
+              <a:t>Android.</a:t>
+            </a:r>
+            <a:endParaRPr lang="es-ES" sz="4800" dirty="0" smtClean="0">
               <a:solidFill>
                 <a:srgbClr val="53585F"/>
               </a:solidFill>
@@ -7837,39 +8747,74 @@
               <a:lnSpc>
                 <a:spcPct val="100000"/>
               </a:lnSpc>
+              <a:buClr>
+                <a:srgbClr val="99CC00"/>
+              </a:buClr>
             </a:pPr>
             <a:r>
-              <a:rPr lang="es-ES" sz="5000" dirty="0">
+              <a:rPr lang="es-ES" sz="4800" dirty="0" smtClean="0">
                 <a:solidFill>
                   <a:srgbClr val="53585F"/>
                 </a:solidFill>
               </a:rPr>
-              <a:t>Desarrollo de APPS en </a:t>
-            </a:r>
-            <a:r>
-              <a:rPr lang="es-ES" sz="5000" dirty="0" smtClean="0">
+              <a:t> Desarrollo </a:t>
+            </a:r>
+            <a:r>
+              <a:rPr lang="es-ES" sz="4800" dirty="0">
                 <a:solidFill>
                   <a:srgbClr val="53585F"/>
                 </a:solidFill>
               </a:rPr>
-              <a:t>Android</a:t>
-            </a:r>
+              <a:t>de APPS en </a:t>
+            </a:r>
+            <a:r>
+              <a:rPr lang="es-ES" sz="4800" dirty="0" smtClean="0">
+                <a:solidFill>
+                  <a:srgbClr val="53585F"/>
+                </a:solidFill>
+              </a:rPr>
+              <a:t> Android.</a:t>
+            </a:r>
+            <a:endParaRPr lang="es-ES" sz="4800" dirty="0" smtClean="0">
+              <a:solidFill>
+                <a:srgbClr val="53585F"/>
+              </a:solidFill>
+            </a:endParaRPr>
           </a:p>
           <a:p>
             <a:pPr>
               <a:lnSpc>
                 <a:spcPct val="100000"/>
               </a:lnSpc>
+              <a:buClr>
+                <a:srgbClr val="99CC00"/>
+              </a:buClr>
             </a:pPr>
             <a:r>
-              <a:rPr lang="es-ES" sz="5000" dirty="0">
+              <a:rPr lang="es-ES" sz="4800" dirty="0" smtClean="0">
                 <a:solidFill>
                   <a:srgbClr val="53585F"/>
                 </a:solidFill>
               </a:rPr>
-              <a:t>Desarrollo avanzado en Android</a:t>
-            </a:r>
-            <a:endParaRPr lang="es-ES" sz="5000" dirty="0">
+              <a:t> Desarrollo </a:t>
+            </a:r>
+            <a:r>
+              <a:rPr lang="es-ES" sz="4800" dirty="0">
+                <a:solidFill>
+                  <a:srgbClr val="53585F"/>
+                </a:solidFill>
+              </a:rPr>
+              <a:t>avanzado en </a:t>
+            </a:r>
+            <a:r>
+              <a:rPr lang="es-ES" sz="4800" dirty="0" smtClean="0">
+                <a:solidFill>
+                  <a:srgbClr val="53585F"/>
+                </a:solidFill>
+              </a:rPr>
+              <a:t>Android.</a:t>
+            </a:r>
+            <a:endParaRPr lang="es-ES" sz="4800" dirty="0">
               <a:solidFill>
                 <a:srgbClr val="53585F"/>
               </a:solidFill>
@@ -8083,9 +9028,12 @@
               <a:lnSpc>
                 <a:spcPct val="100000"/>
               </a:lnSpc>
+              <a:buClr>
+                <a:srgbClr val="A8B2BB"/>
+              </a:buClr>
             </a:pPr>
             <a:r>
-              <a:rPr lang="es-ES" sz="5000" dirty="0">
+              <a:rPr lang="es-ES" sz="4800" dirty="0">
                 <a:solidFill>
                   <a:srgbClr val="53585F"/>
                 </a:solidFill>
@@ -8093,7 +9041,7 @@
               <a:t> </a:t>
             </a:r>
             <a:r>
-              <a:rPr lang="es-ES" sz="5000" dirty="0" smtClean="0">
+              <a:rPr lang="es-ES" sz="4800" dirty="0" smtClean="0">
                 <a:solidFill>
                   <a:srgbClr val="53585F"/>
                 </a:solidFill>
@@ -8101,7 +9049,7 @@
               <a:t>Primeros </a:t>
             </a:r>
             <a:r>
-              <a:rPr lang="es-ES" sz="5000" dirty="0">
+              <a:rPr lang="es-ES" sz="4800" dirty="0">
                 <a:solidFill>
                   <a:srgbClr val="53585F"/>
                 </a:solidFill>
@@ -8109,37 +9057,14 @@
               <a:t>pasos con </a:t>
             </a:r>
             <a:r>
-              <a:rPr lang="es-ES" sz="5000" dirty="0" smtClean="0">
+              <a:rPr lang="es-ES" sz="4800" dirty="0" smtClean="0">
                 <a:solidFill>
                   <a:srgbClr val="53585F"/>
                 </a:solidFill>
               </a:rPr>
-              <a:t>iOS</a:t>
-            </a:r>
-          </a:p>
-          <a:p>
-            <a:pPr>
-              <a:lnSpc>
-                <a:spcPct val="100000"/>
-              </a:lnSpc>
-            </a:pPr>
-            <a:r>
-              <a:rPr lang="es-ES" sz="5400" dirty="0">
-                <a:solidFill>
-                  <a:srgbClr val="53585F"/>
-                </a:solidFill>
-              </a:rPr>
-              <a:t> iPhone App </a:t>
-            </a:r>
-            <a:r>
-              <a:rPr lang="es-ES" sz="5400" dirty="0" err="1" smtClean="0">
-                <a:solidFill>
-                  <a:srgbClr val="53585F"/>
-                </a:solidFill>
-              </a:rPr>
-              <a:t>Development</a:t>
-            </a:r>
-            <a:endParaRPr lang="es-ES" sz="5400" dirty="0" smtClean="0">
+              <a:t>iOS.</a:t>
+            </a:r>
+            <a:endParaRPr lang="es-ES" sz="4800" dirty="0" smtClean="0">
               <a:solidFill>
                 <a:srgbClr val="53585F"/>
               </a:solidFill>
@@ -8150,16 +9075,74 @@
               <a:lnSpc>
                 <a:spcPct val="100000"/>
               </a:lnSpc>
+              <a:buClr>
+                <a:srgbClr val="A8B2BB"/>
+              </a:buClr>
             </a:pPr>
             <a:r>
-              <a:rPr lang="es-ES" sz="5000" dirty="0">
+              <a:rPr lang="es-ES" sz="4800" dirty="0">
                 <a:solidFill>
                   <a:srgbClr val="53585F"/>
                 </a:solidFill>
               </a:rPr>
-              <a:t>Curso: Swift – Apple desde cero</a:t>
-            </a:r>
-            <a:endParaRPr lang="es-ES" sz="5000" dirty="0">
+              <a:t> iPhone App </a:t>
+            </a:r>
+            <a:r>
+              <a:rPr lang="es-ES" sz="4800" dirty="0" err="1" smtClean="0">
+                <a:solidFill>
+                  <a:srgbClr val="53585F"/>
+                </a:solidFill>
+              </a:rPr>
+              <a:t>Development</a:t>
+            </a:r>
+            <a:r>
+              <a:rPr lang="es-ES" sz="4800" dirty="0" smtClean="0">
+                <a:solidFill>
+                  <a:srgbClr val="53585F"/>
+                </a:solidFill>
+              </a:rPr>
+              <a:t>.</a:t>
+            </a:r>
+            <a:endParaRPr lang="es-ES" sz="4800" dirty="0" smtClean="0">
+              <a:solidFill>
+                <a:srgbClr val="53585F"/>
+              </a:solidFill>
+            </a:endParaRPr>
+          </a:p>
+          <a:p>
+            <a:pPr>
+              <a:lnSpc>
+                <a:spcPct val="100000"/>
+              </a:lnSpc>
+              <a:buClr>
+                <a:srgbClr val="A8B2BB"/>
+              </a:buClr>
+            </a:pPr>
+            <a:r>
+              <a:rPr lang="es-ES" sz="4800" dirty="0" smtClean="0">
+                <a:solidFill>
+                  <a:srgbClr val="53585F"/>
+                </a:solidFill>
+              </a:rPr>
+              <a:t> Curso</a:t>
+            </a:r>
+            <a:r>
+              <a:rPr lang="es-ES" sz="4800" dirty="0">
+                <a:solidFill>
+                  <a:srgbClr val="53585F"/>
+                </a:solidFill>
+              </a:rPr>
+              <a:t>: Swift – Apple desde </a:t>
+            </a:r>
+            <a:r>
+              <a:rPr lang="es-ES" sz="4800" dirty="0" smtClean="0">
+                <a:solidFill>
+                  <a:srgbClr val="53585F"/>
+                </a:solidFill>
+              </a:rPr>
+              <a:t>cero.</a:t>
+            </a:r>
+            <a:endParaRPr lang="es-ES" sz="4800" dirty="0">
               <a:solidFill>
                 <a:srgbClr val="53585F"/>
               </a:solidFill>
@@ -8177,7 +9160,7 @@
         </p:nvSpPr>
         <p:spPr>
           <a:xfrm>
-            <a:off x="15906135" y="4615745"/>
+            <a:off x="15448935" y="4732442"/>
             <a:ext cx="8935065" cy="4351338"/>
           </a:xfrm>
           <a:prstGeom prst="rect">
@@ -8367,15 +9350,23 @@
               </a:rPr>
               <a:t> </a:t>
             </a:r>
+            <a:endParaRPr lang="es-ES" sz="4800" dirty="0" smtClean="0">
+              <a:solidFill>
+                <a:srgbClr val="53585F"/>
+              </a:solidFill>
+            </a:endParaRPr>
           </a:p>
           <a:p>
             <a:pPr>
               <a:lnSpc>
                 <a:spcPct val="100000"/>
               </a:lnSpc>
+              <a:buClr>
+                <a:srgbClr val="00ADEF"/>
+              </a:buClr>
             </a:pPr>
             <a:r>
-              <a:rPr lang="es-ES" sz="5000" dirty="0">
+              <a:rPr lang="es-ES" sz="4800" dirty="0">
                 <a:solidFill>
                   <a:srgbClr val="53585F"/>
                 </a:solidFill>
@@ -8383,7 +9374,7 @@
               <a:t> Construyendo aplicaciones en Windows </a:t>
             </a:r>
             <a:r>
-              <a:rPr lang="es-ES" sz="5000" dirty="0" err="1">
+              <a:rPr lang="es-ES" sz="4800" dirty="0" err="1">
                 <a:solidFill>
                   <a:srgbClr val="53585F"/>
                 </a:solidFill>
@@ -8391,7 +9382,7 @@
               <a:t>Phone</a:t>
             </a:r>
             <a:r>
-              <a:rPr lang="es-ES" sz="5000" dirty="0">
+              <a:rPr lang="es-ES" sz="4800" dirty="0">
                 <a:solidFill>
                   <a:srgbClr val="53585F"/>
                 </a:solidFill>
@@ -8399,22 +9390,30 @@
               <a:t> </a:t>
             </a:r>
             <a:r>
-              <a:rPr lang="es-ES" sz="5000" dirty="0" smtClean="0">
+              <a:rPr lang="es-ES" sz="4800" dirty="0" smtClean="0">
                 <a:solidFill>
                   <a:srgbClr val="53585F"/>
                 </a:solidFill>
               </a:rPr>
-              <a:t>8</a:t>
-            </a:r>
+              <a:t>8.</a:t>
+            </a:r>
+            <a:endParaRPr lang="es-ES" sz="4800" dirty="0" smtClean="0">
+              <a:solidFill>
+                <a:srgbClr val="53585F"/>
+              </a:solidFill>
+            </a:endParaRPr>
           </a:p>
           <a:p>
             <a:pPr>
               <a:lnSpc>
                 <a:spcPct val="100000"/>
               </a:lnSpc>
+              <a:buClr>
+                <a:srgbClr val="00ADEF"/>
+              </a:buClr>
             </a:pPr>
             <a:r>
-              <a:rPr lang="es-ES" sz="5400" dirty="0">
+              <a:rPr lang="es-ES" sz="4800" dirty="0">
                 <a:solidFill>
                   <a:srgbClr val="53585F"/>
                 </a:solidFill>
@@ -8422,14 +9421,14 @@
               <a:t> Introducción al desarrollo de aplicaciones </a:t>
             </a:r>
             <a:r>
-              <a:rPr lang="es-ES" sz="5400" dirty="0" smtClean="0">
+              <a:rPr lang="es-ES" sz="4800" dirty="0" smtClean="0">
                 <a:solidFill>
                   <a:srgbClr val="53585F"/>
                 </a:solidFill>
               </a:rPr>
-              <a:t>móviles</a:t>
-            </a:r>
-            <a:endParaRPr lang="es-ES" sz="5000" dirty="0">
+              <a:t>móviles.</a:t>
+            </a:r>
+            <a:endParaRPr lang="es-ES" sz="4800" dirty="0">
               <a:solidFill>
                 <a:srgbClr val="53585F"/>
               </a:solidFill>

</xml_diff>